<commit_message>
ppt ate a momento 3
</commit_message>
<xml_diff>
--- a/Especificacao/FeelItaly.pptx
+++ b/Especificacao/FeelItaly.pptx
@@ -4497,8 +4497,8 @@
         </p:nvSpPr>
         <p:spPr>
           <a:xfrm>
-            <a:off x="964494" y="2337954"/>
-            <a:ext cx="2098126" cy="2182092"/>
+            <a:off x="636557" y="2073600"/>
+            <a:ext cx="2754000" cy="2710800"/>
           </a:xfrm>
           <a:prstGeom prst="ellipse">
             <a:avLst/>
@@ -4822,8 +4822,8 @@
         </p:nvSpPr>
         <p:spPr>
           <a:xfrm>
-            <a:off x="964494" y="2337954"/>
-            <a:ext cx="2098126" cy="2182092"/>
+            <a:off x="636557" y="2073599"/>
+            <a:ext cx="2754000" cy="2710800"/>
           </a:xfrm>
           <a:prstGeom prst="ellipse">
             <a:avLst/>
@@ -5744,8 +5744,8 @@
         </p:nvSpPr>
         <p:spPr>
           <a:xfrm>
-            <a:off x="483177" y="2348344"/>
-            <a:ext cx="3060759" cy="2317174"/>
+            <a:off x="488691" y="2073599"/>
+            <a:ext cx="3049732" cy="2710800"/>
           </a:xfrm>
           <a:prstGeom prst="ellipse">
             <a:avLst/>
@@ -8024,24 +8024,150 @@
       </p:sp>
       <p:sp>
         <p:nvSpPr>
-          <p:cNvPr id="2" name="Título 1">
-            <a:extLst>
-              <a:ext uri="{FF2B5EF4-FFF2-40B4-BE49-F238E27FC236}">
-                <a16:creationId xmlns:a16="http://schemas.microsoft.com/office/drawing/2014/main" id="{7E8400A2-82BA-4036-A6FE-BF5F48A90A12}"/>
-              </a:ext>
-            </a:extLst>
-          </p:cNvPr>
-          <p:cNvSpPr>
-            <a:spLocks noGrp="1"/>
-          </p:cNvSpPr>
-          <p:nvPr>
-            <p:ph type="title"/>
-          </p:nvPr>
+          <p:cNvPr id="7" name="CaixaDeTexto 6">
+            <a:extLst>
+              <a:ext uri="{FF2B5EF4-FFF2-40B4-BE49-F238E27FC236}">
+                <a16:creationId xmlns:a16="http://schemas.microsoft.com/office/drawing/2014/main" id="{AE58CAA1-ED69-EC49-BB82-078A7BEFA70A}"/>
+              </a:ext>
+            </a:extLst>
+          </p:cNvPr>
+          <p:cNvSpPr txBox="1"/>
+          <p:nvPr/>
         </p:nvSpPr>
         <p:spPr>
           <a:xfrm>
-            <a:off x="964494" y="2337954"/>
-            <a:ext cx="2098126" cy="2182092"/>
+            <a:off x="3685415" y="1305341"/>
+            <a:ext cx="8093472" cy="4247317"/>
+          </a:xfrm>
+          <a:prstGeom prst="rect">
+            <a:avLst/>
+          </a:prstGeom>
+          <a:noFill/>
+          <a:ln>
+            <a:solidFill>
+              <a:schemeClr val="tx1"/>
+            </a:solidFill>
+          </a:ln>
+        </p:spPr>
+        <p:txBody>
+          <a:bodyPr wrap="square" rtlCol="0">
+            <a:spAutoFit/>
+          </a:bodyPr>
+          <a:lstStyle/>
+          <a:p>
+            <a:pPr marL="342900" indent="-342900">
+              <a:buAutoNum type="arabicPeriod"/>
+            </a:pPr>
+            <a:r>
+              <a:rPr lang="pt-PT" dirty="0"/>
+              <a:t>O sistema deve estar disponível 24 horas por dia;</a:t>
+            </a:r>
+          </a:p>
+          <a:p>
+            <a:pPr marL="342900" indent="-342900">
+              <a:buAutoNum type="arabicPeriod"/>
+            </a:pPr>
+            <a:endParaRPr lang="pt-PT" dirty="0"/>
+          </a:p>
+          <a:p>
+            <a:pPr marL="342900" indent="-342900">
+              <a:buAutoNum type="arabicPeriod" startAt="2"/>
+            </a:pPr>
+            <a:r>
+              <a:rPr lang="pt-PT" dirty="0"/>
+              <a:t>O sistema deve ser de fácil uso;</a:t>
+            </a:r>
+          </a:p>
+          <a:p>
+            <a:pPr marL="342900" indent="-342900">
+              <a:buAutoNum type="arabicPeriod" startAt="2"/>
+            </a:pPr>
+            <a:endParaRPr lang="pt-PT" dirty="0"/>
+          </a:p>
+          <a:p>
+            <a:pPr marL="342900" indent="-342900">
+              <a:buAutoNum type="arabicPeriod" startAt="3"/>
+            </a:pPr>
+            <a:r>
+              <a:rPr lang="pt-PT" dirty="0"/>
+              <a:t>O sistema deve ser produzido de forma a funcionar corretamente em todos os browsers;</a:t>
+            </a:r>
+          </a:p>
+          <a:p>
+            <a:r>
+              <a:rPr lang="pt-PT" dirty="0"/>
+              <a:t>			(...)</a:t>
+            </a:r>
+          </a:p>
+          <a:p>
+            <a:pPr marL="342900" indent="-342900">
+              <a:buAutoNum type="arabicPeriod" startAt="6"/>
+            </a:pPr>
+            <a:r>
+              <a:rPr lang="pt-PT" dirty="0"/>
+              <a:t>A aplicação será desenvolvida para web e para mobile;</a:t>
+            </a:r>
+          </a:p>
+          <a:p>
+            <a:r>
+              <a:rPr lang="pt-PT" dirty="0"/>
+              <a:t>			(...)</a:t>
+            </a:r>
+          </a:p>
+          <a:p>
+            <a:pPr marL="342900" indent="-342900">
+              <a:buAutoNum type="arabicPeriod" startAt="9"/>
+            </a:pPr>
+            <a:r>
+              <a:rPr lang="pt-PT" dirty="0"/>
+              <a:t>O sistema deve recorrer a uma API de mapas para representar a localização do utilizador e a localização de estabelecimentos comerciais de alimentos.</a:t>
+            </a:r>
+          </a:p>
+          <a:p>
+            <a:r>
+              <a:rPr lang="pt-PT" dirty="0"/>
+              <a:t>			(...)</a:t>
+            </a:r>
+          </a:p>
+          <a:p>
+            <a:r>
+              <a:rPr lang="pt-PT" dirty="0"/>
+              <a:t>11. O sistema deve recorrer a um sistema de reconhecimento de voz para</a:t>
+            </a:r>
+          </a:p>
+          <a:p>
+            <a:r>
+              <a:rPr lang="pt-PT" dirty="0"/>
+              <a:t>reconhecer e efetuar as ações ditas pelo utilizador.</a:t>
+            </a:r>
+          </a:p>
+          <a:p>
+            <a:pPr marL="342900" indent="-342900">
+              <a:buFont typeface="Arial" panose="020B0604020202020204" pitchFamily="34" charset="0"/>
+              <a:buChar char="•"/>
+            </a:pPr>
+            <a:endParaRPr lang="pt-PT" dirty="0"/>
+          </a:p>
+        </p:txBody>
+      </p:sp>
+      <p:sp>
+        <p:nvSpPr>
+          <p:cNvPr id="10" name="Título 1">
+            <a:extLst>
+              <a:ext uri="{FF2B5EF4-FFF2-40B4-BE49-F238E27FC236}">
+                <a16:creationId xmlns:a16="http://schemas.microsoft.com/office/drawing/2014/main" id="{ED1FD719-0D33-E44E-ABFB-177837871CDE}"/>
+              </a:ext>
+            </a:extLst>
+          </p:cNvPr>
+          <p:cNvSpPr txBox="1">
+            <a:spLocks/>
+          </p:cNvSpPr>
+          <p:nvPr/>
+        </p:nvSpPr>
+        <p:spPr>
+          <a:xfrm>
+            <a:off x="640080" y="2074363"/>
+            <a:ext cx="2752354" cy="2709275"/>
           </a:xfrm>
           <a:prstGeom prst="ellipse">
             <a:avLst/>
@@ -8057,170 +8183,86 @@
         </p:spPr>
         <p:txBody>
           <a:bodyPr vert="horz" lIns="91440" tIns="45720" rIns="91440" bIns="45720" rtlCol="0" anchor="ctr">
-            <a:noAutofit/>
+            <a:normAutofit/>
           </a:bodyPr>
-          <a:lstStyle/>
+          <a:lstStyle>
+            <a:lvl1pPr algn="l" defTabSz="914400" rtl="0" eaLnBrk="1" latinLnBrk="0" hangingPunct="1">
+              <a:lnSpc>
+                <a:spcPct val="90000"/>
+              </a:lnSpc>
+              <a:spcBef>
+                <a:spcPct val="0"/>
+              </a:spcBef>
+              <a:buNone/>
+              <a:defRPr sz="4400" kern="1200">
+                <a:solidFill>
+                  <a:schemeClr val="tx1"/>
+                </a:solidFill>
+                <a:latin typeface="+mj-lt"/>
+                <a:ea typeface="+mj-ea"/>
+                <a:cs typeface="+mj-cs"/>
+              </a:defRPr>
+            </a:lvl1pPr>
+          </a:lstStyle>
           <a:p>
             <a:pPr algn="ctr"/>
+            <a:r>
+              <a:rPr lang="en-US" sz="1800" b="1" dirty="0" err="1">
+                <a:solidFill>
+                  <a:srgbClr val="FFFFFF"/>
+                </a:solidFill>
+                <a:latin typeface="Times" pitchFamily="2" charset="0"/>
+              </a:rPr>
+              <a:t>Requisitos</a:t>
+            </a:r>
+            <a:r>
+              <a:rPr lang="en-US" sz="1800" b="1" dirty="0">
+                <a:solidFill>
+                  <a:srgbClr val="FFFFFF"/>
+                </a:solidFill>
+                <a:latin typeface="Times" pitchFamily="2" charset="0"/>
+              </a:rPr>
+              <a:t> do Sistema </a:t>
+            </a:r>
+            <a:r>
+              <a:rPr lang="en-US" sz="1800" b="1" dirty="0" err="1">
+                <a:solidFill>
+                  <a:srgbClr val="FFFFFF"/>
+                </a:solidFill>
+                <a:latin typeface="Times" pitchFamily="2" charset="0"/>
+              </a:rPr>
+              <a:t>não</a:t>
+            </a:r>
+            <a:r>
+              <a:rPr lang="en-US" sz="1800" b="1" dirty="0">
+                <a:solidFill>
+                  <a:srgbClr val="FFFFFF"/>
+                </a:solidFill>
+                <a:latin typeface="Times" pitchFamily="2" charset="0"/>
+              </a:rPr>
+              <a:t> </a:t>
+            </a:r>
+            <a:r>
+              <a:rPr lang="en-US" sz="1800" b="1" dirty="0" err="1">
+                <a:solidFill>
+                  <a:srgbClr val="FFFFFF"/>
+                </a:solidFill>
+                <a:latin typeface="Times" pitchFamily="2" charset="0"/>
+              </a:rPr>
+              <a:t>Funcionais</a:t>
+            </a:r>
             <a:br>
-              <a:rPr lang="pt-PT" sz="1800" b="1" dirty="0">
-                <a:solidFill>
-                  <a:schemeClr val="bg1"/>
-                </a:solidFill>
-                <a:latin typeface="Times" pitchFamily="2" charset="0"/>
+              <a:rPr lang="en-US" sz="1800" dirty="0">
+                <a:solidFill>
+                  <a:srgbClr val="FFFFFF"/>
+                </a:solidFill>
               </a:rPr>
             </a:br>
-            <a:r>
-              <a:rPr lang="pt-PT" sz="1800" b="1" dirty="0">
-                <a:solidFill>
-                  <a:schemeClr val="bg1"/>
-                </a:solidFill>
-                <a:latin typeface="Times" pitchFamily="2" charset="0"/>
-              </a:rPr>
-              <a:t>Requisitos de Sistema não Funcionais</a:t>
-            </a:r>
-            <a:br>
-              <a:rPr lang="en-US" sz="1800" b="1" kern="1200" dirty="0">
-                <a:solidFill>
-                  <a:schemeClr val="bg1"/>
-                </a:solidFill>
-                <a:latin typeface="Times" pitchFamily="2" charset="0"/>
-              </a:rPr>
-            </a:br>
-            <a:endParaRPr lang="en-US" sz="1800" b="1" kern="1200" dirty="0">
+            <a:endParaRPr lang="en-US" sz="1800" dirty="0">
               <a:solidFill>
-                <a:schemeClr val="bg1"/>
+                <a:srgbClr val="FFFFFF"/>
               </a:solidFill>
-              <a:latin typeface="Times" pitchFamily="2" charset="0"/>
             </a:endParaRPr>
-          </a:p>
-        </p:txBody>
-      </p:sp>
-      <p:sp>
-        <p:nvSpPr>
-          <p:cNvPr id="7" name="CaixaDeTexto 6">
-            <a:extLst>
-              <a:ext uri="{FF2B5EF4-FFF2-40B4-BE49-F238E27FC236}">
-                <a16:creationId xmlns:a16="http://schemas.microsoft.com/office/drawing/2014/main" id="{AE58CAA1-ED69-EC49-BB82-078A7BEFA70A}"/>
-              </a:ext>
-            </a:extLst>
-          </p:cNvPr>
-          <p:cNvSpPr txBox="1"/>
-          <p:nvPr/>
-        </p:nvSpPr>
-        <p:spPr>
-          <a:xfrm>
-            <a:off x="3367701" y="1305341"/>
-            <a:ext cx="8519218" cy="4247317"/>
-          </a:xfrm>
-          <a:prstGeom prst="rect">
-            <a:avLst/>
-          </a:prstGeom>
-          <a:noFill/>
-          <a:ln>
-            <a:solidFill>
-              <a:schemeClr val="tx1"/>
-            </a:solidFill>
-          </a:ln>
-        </p:spPr>
-        <p:txBody>
-          <a:bodyPr wrap="square" rtlCol="0">
-            <a:spAutoFit/>
-          </a:bodyPr>
-          <a:lstStyle/>
-          <a:p>
-            <a:pPr marL="342900" indent="-342900">
-              <a:buAutoNum type="arabicPeriod"/>
-            </a:pPr>
-            <a:r>
-              <a:rPr lang="pt-PT" dirty="0"/>
-              <a:t>O sistema deve estar disponível 24 horas por dia;</a:t>
-            </a:r>
-          </a:p>
-          <a:p>
-            <a:pPr marL="342900" indent="-342900">
-              <a:buAutoNum type="arabicPeriod"/>
-            </a:pPr>
-            <a:endParaRPr lang="pt-PT" dirty="0"/>
-          </a:p>
-          <a:p>
-            <a:pPr marL="342900" indent="-342900">
-              <a:buAutoNum type="arabicPeriod" startAt="2"/>
-            </a:pPr>
-            <a:r>
-              <a:rPr lang="pt-PT" dirty="0"/>
-              <a:t>O sistema deve ser de fácil uso;</a:t>
-            </a:r>
-          </a:p>
-          <a:p>
-            <a:pPr marL="342900" indent="-342900">
-              <a:buAutoNum type="arabicPeriod" startAt="2"/>
-            </a:pPr>
-            <a:endParaRPr lang="pt-PT" dirty="0"/>
-          </a:p>
-          <a:p>
-            <a:pPr marL="342900" indent="-342900">
-              <a:buAutoNum type="arabicPeriod" startAt="3"/>
-            </a:pPr>
-            <a:r>
-              <a:rPr lang="pt-PT" dirty="0"/>
-              <a:t>O sistema deve ser produzido de forma a funcionar corretamente em todos os browsers;</a:t>
-            </a:r>
-          </a:p>
-          <a:p>
-            <a:r>
-              <a:rPr lang="pt-PT" dirty="0"/>
-              <a:t>			(...)</a:t>
-            </a:r>
-          </a:p>
-          <a:p>
-            <a:pPr marL="342900" indent="-342900">
-              <a:buAutoNum type="arabicPeriod" startAt="6"/>
-            </a:pPr>
-            <a:r>
-              <a:rPr lang="pt-PT" dirty="0"/>
-              <a:t>A aplicação será desenvolvida para web e para mobile;</a:t>
-            </a:r>
-          </a:p>
-          <a:p>
-            <a:r>
-              <a:rPr lang="pt-PT" dirty="0"/>
-              <a:t>			(...)</a:t>
-            </a:r>
-          </a:p>
-          <a:p>
-            <a:pPr marL="342900" indent="-342900">
-              <a:buAutoNum type="arabicPeriod" startAt="9"/>
-            </a:pPr>
-            <a:r>
-              <a:rPr lang="pt-PT" dirty="0"/>
-              <a:t>O sistema deve recorrer a uma API de mapas para representar a localização do utilizador e a localização de estabelecimentos comerciais de alimentos.</a:t>
-            </a:r>
-          </a:p>
-          <a:p>
-            <a:r>
-              <a:rPr lang="pt-PT" dirty="0"/>
-              <a:t>			(...)</a:t>
-            </a:r>
-          </a:p>
-          <a:p>
-            <a:r>
-              <a:rPr lang="pt-PT" dirty="0"/>
-              <a:t>11. O sistema deve recorrer a um sistema de reconhecimento de voz para</a:t>
-            </a:r>
-          </a:p>
-          <a:p>
-            <a:r>
-              <a:rPr lang="pt-PT" dirty="0"/>
-              <a:t>reconhecer e efetuar as ações ditas pelo utilizador.</a:t>
-            </a:r>
-          </a:p>
-          <a:p>
-            <a:pPr marL="342900" indent="-342900">
-              <a:buFont typeface="Arial" panose="020B0604020202020204" pitchFamily="34" charset="0"/>
-              <a:buChar char="•"/>
-            </a:pPr>
-            <a:endParaRPr lang="pt-PT" dirty="0"/>
           </a:p>
         </p:txBody>
       </p:sp>
@@ -8406,8 +8448,8 @@
         </p:nvSpPr>
         <p:spPr>
           <a:xfrm>
-            <a:off x="964494" y="2337954"/>
-            <a:ext cx="2098126" cy="2182092"/>
+            <a:off x="636557" y="2090172"/>
+            <a:ext cx="2754000" cy="2710800"/>
           </a:xfrm>
           <a:prstGeom prst="ellipse">
             <a:avLst/>
@@ -8752,8 +8794,8 @@
         </p:nvSpPr>
         <p:spPr>
           <a:xfrm>
-            <a:off x="964494" y="2337954"/>
-            <a:ext cx="2098126" cy="2182092"/>
+            <a:off x="636557" y="2073599"/>
+            <a:ext cx="2754000" cy="2710800"/>
           </a:xfrm>
           <a:prstGeom prst="ellipse">
             <a:avLst/>

</xml_diff>